<commit_message>
Đô án PTUD Web
</commit_message>
<xml_diff>
--- a/ProjectCT449_B1906551_LuuHoangPhuc.pptx
+++ b/ProjectCT449_B1906551_LuuHoangPhuc.pptx
@@ -23,9 +23,8 @@
     <p:sldId id="276" r:id="rId17"/>
     <p:sldId id="277" r:id="rId18"/>
     <p:sldId id="278" r:id="rId19"/>
-    <p:sldId id="280" r:id="rId20"/>
-    <p:sldId id="266" r:id="rId21"/>
-    <p:sldId id="262" r:id="rId22"/>
+    <p:sldId id="266" r:id="rId20"/>
+    <p:sldId id="262" r:id="rId21"/>
   </p:sldIdLst>
   <p:sldSz cx="9144000" cy="6858000" type="screen4x3"/>
   <p:notesSz cx="6858000" cy="9144000"/>
@@ -4045,7 +4044,13 @@
       </p:sp>
       <p:pic>
         <p:nvPicPr>
-          <p:cNvPr id="5" name="Picture 4"/>
+          <p:cNvPr id="6" name="Picture 5">
+            <a:extLst>
+              <a:ext uri="{FF2B5EF4-FFF2-40B4-BE49-F238E27FC236}">
+                <a16:creationId xmlns:a16="http://schemas.microsoft.com/office/drawing/2014/main" id="{14B22229-50AB-9FFC-7783-55EEAB243657}"/>
+              </a:ext>
+            </a:extLst>
+          </p:cNvPr>
           <p:cNvPicPr>
             <a:picLocks noChangeAspect="1"/>
           </p:cNvPicPr>
@@ -4059,8 +4064,8 @@
         </p:blipFill>
         <p:spPr>
           <a:xfrm>
-            <a:off x="952500" y="2258140"/>
-            <a:ext cx="7543800" cy="3685460"/>
+            <a:off x="323461" y="2438400"/>
+            <a:ext cx="8534400" cy="3600450"/>
           </a:xfrm>
           <a:prstGeom prst="rect">
             <a:avLst/>
@@ -4147,7 +4152,13 @@
       </p:sp>
       <p:pic>
         <p:nvPicPr>
-          <p:cNvPr id="6" name="Picture 5"/>
+          <p:cNvPr id="5" name="Picture 4">
+            <a:extLst>
+              <a:ext uri="{FF2B5EF4-FFF2-40B4-BE49-F238E27FC236}">
+                <a16:creationId xmlns:a16="http://schemas.microsoft.com/office/drawing/2014/main" id="{B1936FD8-97E9-F37E-C8FC-8DEEAE57D28E}"/>
+              </a:ext>
+            </a:extLst>
+          </p:cNvPr>
           <p:cNvPicPr>
             <a:picLocks noChangeAspect="1"/>
           </p:cNvPicPr>
@@ -4161,8 +4172,8 @@
         </p:blipFill>
         <p:spPr>
           <a:xfrm>
-            <a:off x="875661" y="2362200"/>
-            <a:ext cx="7697477" cy="3744502"/>
+            <a:off x="457200" y="2400300"/>
+            <a:ext cx="8534400" cy="3157538"/>
           </a:xfrm>
           <a:prstGeom prst="rect">
             <a:avLst/>
@@ -4351,7 +4362,13 @@
       </p:sp>
       <p:pic>
         <p:nvPicPr>
-          <p:cNvPr id="5" name="Picture 4"/>
+          <p:cNvPr id="6" name="Picture 5">
+            <a:extLst>
+              <a:ext uri="{FF2B5EF4-FFF2-40B4-BE49-F238E27FC236}">
+                <a16:creationId xmlns:a16="http://schemas.microsoft.com/office/drawing/2014/main" id="{F09CFF83-7550-0192-28F8-DE718F7B1064}"/>
+              </a:ext>
+            </a:extLst>
+          </p:cNvPr>
           <p:cNvPicPr>
             <a:picLocks noChangeAspect="1"/>
           </p:cNvPicPr>
@@ -4365,8 +4382,8 @@
         </p:blipFill>
         <p:spPr>
           <a:xfrm>
-            <a:off x="621323" y="2308906"/>
-            <a:ext cx="7989277" cy="3890611"/>
+            <a:off x="228600" y="2133600"/>
+            <a:ext cx="8686800" cy="2886230"/>
           </a:xfrm>
           <a:prstGeom prst="rect">
             <a:avLst/>
@@ -4456,7 +4473,13 @@
       </p:sp>
       <p:pic>
         <p:nvPicPr>
-          <p:cNvPr id="5" name="Picture 4"/>
+          <p:cNvPr id="6" name="Picture 5">
+            <a:extLst>
+              <a:ext uri="{FF2B5EF4-FFF2-40B4-BE49-F238E27FC236}">
+                <a16:creationId xmlns:a16="http://schemas.microsoft.com/office/drawing/2014/main" id="{3B38113C-3DD7-020A-B18D-9FDC7F8DD842}"/>
+              </a:ext>
+            </a:extLst>
+          </p:cNvPr>
           <p:cNvPicPr>
             <a:picLocks noChangeAspect="1"/>
           </p:cNvPicPr>
@@ -4470,8 +4493,8 @@
         </p:blipFill>
         <p:spPr>
           <a:xfrm>
-            <a:off x="971230" y="2438400"/>
-            <a:ext cx="7506339" cy="3659340"/>
+            <a:off x="381000" y="2333625"/>
+            <a:ext cx="7772400" cy="3290888"/>
           </a:xfrm>
           <a:prstGeom prst="rect">
             <a:avLst/>
@@ -4660,7 +4683,13 @@
       </p:sp>
       <p:pic>
         <p:nvPicPr>
-          <p:cNvPr id="5" name="Picture 4"/>
+          <p:cNvPr id="6" name="Picture 5">
+            <a:extLst>
+              <a:ext uri="{FF2B5EF4-FFF2-40B4-BE49-F238E27FC236}">
+                <a16:creationId xmlns:a16="http://schemas.microsoft.com/office/drawing/2014/main" id="{59039B4D-A71D-A8E7-6511-F6A2A2A266ED}"/>
+              </a:ext>
+            </a:extLst>
+          </p:cNvPr>
           <p:cNvPicPr>
             <a:picLocks noChangeAspect="1"/>
           </p:cNvPicPr>
@@ -4674,8 +4703,8 @@
         </p:blipFill>
         <p:spPr>
           <a:xfrm>
-            <a:off x="594360" y="2517926"/>
-            <a:ext cx="7787640" cy="3776194"/>
+            <a:off x="419100" y="2286000"/>
+            <a:ext cx="8305800" cy="3152775"/>
           </a:xfrm>
           <a:prstGeom prst="rect">
             <a:avLst/>
@@ -4762,7 +4791,13 @@
       </p:sp>
       <p:pic>
         <p:nvPicPr>
-          <p:cNvPr id="4" name="Picture 3"/>
+          <p:cNvPr id="6" name="Picture 5">
+            <a:extLst>
+              <a:ext uri="{FF2B5EF4-FFF2-40B4-BE49-F238E27FC236}">
+                <a16:creationId xmlns:a16="http://schemas.microsoft.com/office/drawing/2014/main" id="{753393B8-2E45-9407-70DD-ECDCF52CAAF9}"/>
+              </a:ext>
+            </a:extLst>
+          </p:cNvPr>
           <p:cNvPicPr>
             <a:picLocks noChangeAspect="1"/>
           </p:cNvPicPr>
@@ -4776,8 +4811,8 @@
         </p:blipFill>
         <p:spPr>
           <a:xfrm>
-            <a:off x="914400" y="2432896"/>
-            <a:ext cx="7518177" cy="3663104"/>
+            <a:off x="228600" y="2286000"/>
+            <a:ext cx="8610600" cy="3124200"/>
           </a:xfrm>
           <a:prstGeom prst="rect">
             <a:avLst/>
@@ -4831,268 +4866,47 @@
           <a:p>
             <a:r>
               <a:rPr lang="en-US"/>
-              <a:t>Kết quả thực hiện</a:t>
+              <a:t>Mã nguồn</a:t>
             </a:r>
             <a:endParaRPr lang="vi-VN"/>
           </a:p>
         </p:txBody>
       </p:sp>
-      <p:pic>
-        <p:nvPicPr>
-          <p:cNvPr id="4" name="Content Placeholder 3"/>
-          <p:cNvPicPr>
-            <a:picLocks noGrp="1" noChangeAspect="1"/>
-          </p:cNvPicPr>
+      <p:sp>
+        <p:nvSpPr>
+          <p:cNvPr id="3" name="Content Placeholder 2"/>
+          <p:cNvSpPr>
+            <a:spLocks noGrp="1"/>
+          </p:cNvSpPr>
           <p:nvPr>
             <p:ph idx="1"/>
           </p:nvPr>
-        </p:nvPicPr>
-        <p:blipFill>
-          <a:blip r:embed="rId2"/>
-          <a:stretch>
-            <a:fillRect/>
-          </a:stretch>
-        </p:blipFill>
+        </p:nvSpPr>
         <p:spPr>
           <a:xfrm>
-            <a:off x="685800" y="2209800"/>
-            <a:ext cx="8229600" cy="4007643"/>
+            <a:off x="609600" y="3276600"/>
+            <a:ext cx="8229600" cy="728662"/>
           </a:xfrm>
-          <a:prstGeom prst="rect">
-            <a:avLst/>
-          </a:prstGeom>
         </p:spPr>
-      </p:pic>
-      <p:sp>
-        <p:nvSpPr>
-          <p:cNvPr id="5" name="Content Placeholder 2"/>
-          <p:cNvSpPr txBox="1">
-            <a:spLocks/>
-          </p:cNvSpPr>
-          <p:nvPr/>
-        </p:nvSpPr>
-        <p:spPr bwMode="auto">
-          <a:xfrm>
-            <a:off x="609600" y="1633538"/>
-            <a:ext cx="8229600" cy="4691062"/>
-          </a:xfrm>
-          <a:prstGeom prst="rect">
-            <a:avLst/>
-          </a:prstGeom>
-          <a:noFill/>
-          <a:ln>
-            <a:noFill/>
-          </a:ln>
-          <a:effectLst/>
-          <a:extLst>
-            <a:ext uri="{909E8E84-426E-40DD-AFC4-6F175D3DCCD1}">
-              <a14:hiddenFill xmlns:a14="http://schemas.microsoft.com/office/drawing/2010/main">
-                <a:solidFill>
-                  <a:schemeClr val="accent1"/>
-                </a:solidFill>
-              </a14:hiddenFill>
-            </a:ext>
-            <a:ext uri="{91240B29-F687-4F45-9708-019B960494DF}">
-              <a14:hiddenLine xmlns:a14="http://schemas.microsoft.com/office/drawing/2010/main" w="9525">
-                <a:solidFill>
-                  <a:schemeClr val="tx1"/>
-                </a:solidFill>
-                <a:miter lim="800000"/>
-                <a:headEnd/>
-                <a:tailEnd/>
-              </a14:hiddenLine>
-            </a:ext>
-            <a:ext uri="{AF507438-7753-43E0-B8FC-AC1667EBCBE1}">
-              <a14:hiddenEffects xmlns:a14="http://schemas.microsoft.com/office/drawing/2010/main">
-                <a:effectLst>
-                  <a:outerShdw dist="35921" dir="2700000" algn="ctr" rotWithShape="0">
-                    <a:schemeClr val="bg2"/>
-                  </a:outerShdw>
-                </a:effectLst>
-              </a14:hiddenEffects>
-            </a:ext>
-          </a:extLst>
-        </p:spPr>
-        <p:txBody>
-          <a:bodyPr vert="horz" wrap="square" lIns="91440" tIns="45720" rIns="91440" bIns="45720" numCol="1" anchor="t" anchorCtr="0" compatLnSpc="1">
-            <a:prstTxWarp prst="textNoShape">
-              <a:avLst/>
-            </a:prstTxWarp>
-          </a:bodyPr>
-          <a:lstStyle>
-            <a:lvl1pPr marL="342900" indent="-342900" algn="l" rtl="0" fontAlgn="base">
-              <a:spcBef>
-                <a:spcPct val="20000"/>
-              </a:spcBef>
-              <a:spcAft>
-                <a:spcPct val="0"/>
-              </a:spcAft>
-              <a:buChar char="•"/>
-              <a:defRPr sz="2900" kern="1200">
-                <a:solidFill>
-                  <a:srgbClr val="000066"/>
-                </a:solidFill>
-                <a:latin typeface="+mn-lt"/>
-                <a:ea typeface="+mn-ea"/>
-                <a:cs typeface="+mn-cs"/>
-              </a:defRPr>
-            </a:lvl1pPr>
-            <a:lvl2pPr marL="742950" indent="-285750" algn="l" rtl="0" fontAlgn="base">
-              <a:spcBef>
-                <a:spcPct val="20000"/>
-              </a:spcBef>
-              <a:spcAft>
-                <a:spcPct val="0"/>
-              </a:spcAft>
-              <a:buChar char="–"/>
-              <a:defRPr sz="2600" kern="1200">
-                <a:solidFill>
-                  <a:srgbClr val="000066"/>
-                </a:solidFill>
-                <a:latin typeface="+mn-lt"/>
-                <a:ea typeface="+mn-ea"/>
-                <a:cs typeface="+mn-cs"/>
-              </a:defRPr>
-            </a:lvl2pPr>
-            <a:lvl3pPr marL="1143000" indent="-228600" algn="l" rtl="0" fontAlgn="base">
-              <a:spcBef>
-                <a:spcPct val="20000"/>
-              </a:spcBef>
-              <a:spcAft>
-                <a:spcPct val="0"/>
-              </a:spcAft>
-              <a:buChar char="•"/>
-              <a:defRPr sz="2200" kern="1200">
-                <a:solidFill>
-                  <a:srgbClr val="000066"/>
-                </a:solidFill>
-                <a:latin typeface="+mn-lt"/>
-                <a:ea typeface="+mn-ea"/>
-                <a:cs typeface="+mn-cs"/>
-              </a:defRPr>
-            </a:lvl3pPr>
-            <a:lvl4pPr marL="1600200" indent="-228600" algn="l" rtl="0" fontAlgn="base">
-              <a:spcBef>
-                <a:spcPct val="20000"/>
-              </a:spcBef>
-              <a:spcAft>
-                <a:spcPct val="0"/>
-              </a:spcAft>
-              <a:buChar char="–"/>
-              <a:defRPr kern="1200">
-                <a:solidFill>
-                  <a:srgbClr val="000066"/>
-                </a:solidFill>
-                <a:latin typeface="+mn-lt"/>
-                <a:ea typeface="+mn-ea"/>
-                <a:cs typeface="+mn-cs"/>
-              </a:defRPr>
-            </a:lvl4pPr>
-            <a:lvl5pPr marL="2057400" indent="-228600" algn="l" rtl="0" fontAlgn="base">
-              <a:spcBef>
-                <a:spcPct val="20000"/>
-              </a:spcBef>
-              <a:spcAft>
-                <a:spcPct val="0"/>
-              </a:spcAft>
-              <a:buChar char="»"/>
-              <a:defRPr kern="1200">
-                <a:solidFill>
-                  <a:srgbClr val="000066"/>
-                </a:solidFill>
-                <a:latin typeface="+mn-lt"/>
-                <a:ea typeface="+mn-ea"/>
-                <a:cs typeface="+mn-cs"/>
-              </a:defRPr>
-            </a:lvl5pPr>
-            <a:lvl6pPr marL="2514600" indent="-228600" algn="l" defTabSz="914400" rtl="0" eaLnBrk="1" latinLnBrk="0" hangingPunct="1">
-              <a:lnSpc>
-                <a:spcPct val="90000"/>
-              </a:lnSpc>
-              <a:spcBef>
-                <a:spcPts val="500"/>
-              </a:spcBef>
-              <a:buFont typeface="Arial" panose="020B0604020202020204" pitchFamily="34" charset="0"/>
-              <a:buChar char="•"/>
-              <a:defRPr sz="1800" kern="1200">
-                <a:solidFill>
-                  <a:schemeClr val="tx1"/>
-                </a:solidFill>
-                <a:latin typeface="+mn-lt"/>
-                <a:ea typeface="+mn-ea"/>
-                <a:cs typeface="+mn-cs"/>
-              </a:defRPr>
-            </a:lvl6pPr>
-            <a:lvl7pPr marL="2971800" indent="-228600" algn="l" defTabSz="914400" rtl="0" eaLnBrk="1" latinLnBrk="0" hangingPunct="1">
-              <a:lnSpc>
-                <a:spcPct val="90000"/>
-              </a:lnSpc>
-              <a:spcBef>
-                <a:spcPts val="500"/>
-              </a:spcBef>
-              <a:buFont typeface="Arial" panose="020B0604020202020204" pitchFamily="34" charset="0"/>
-              <a:buChar char="•"/>
-              <a:defRPr sz="1800" kern="1200">
-                <a:solidFill>
-                  <a:schemeClr val="tx1"/>
-                </a:solidFill>
-                <a:latin typeface="+mn-lt"/>
-                <a:ea typeface="+mn-ea"/>
-                <a:cs typeface="+mn-cs"/>
-              </a:defRPr>
-            </a:lvl7pPr>
-            <a:lvl8pPr marL="3429000" indent="-228600" algn="l" defTabSz="914400" rtl="0" eaLnBrk="1" latinLnBrk="0" hangingPunct="1">
-              <a:lnSpc>
-                <a:spcPct val="90000"/>
-              </a:lnSpc>
-              <a:spcBef>
-                <a:spcPts val="500"/>
-              </a:spcBef>
-              <a:buFont typeface="Arial" panose="020B0604020202020204" pitchFamily="34" charset="0"/>
-              <a:buChar char="•"/>
-              <a:defRPr sz="1800" kern="1200">
-                <a:solidFill>
-                  <a:schemeClr val="tx1"/>
-                </a:solidFill>
-                <a:latin typeface="+mn-lt"/>
-                <a:ea typeface="+mn-ea"/>
-                <a:cs typeface="+mn-cs"/>
-              </a:defRPr>
-            </a:lvl8pPr>
-            <a:lvl9pPr marL="3886200" indent="-228600" algn="l" defTabSz="914400" rtl="0" eaLnBrk="1" latinLnBrk="0" hangingPunct="1">
-              <a:lnSpc>
-                <a:spcPct val="90000"/>
-              </a:lnSpc>
-              <a:spcBef>
-                <a:spcPts val="500"/>
-              </a:spcBef>
-              <a:buFont typeface="Arial" panose="020B0604020202020204" pitchFamily="34" charset="0"/>
-              <a:buChar char="•"/>
-              <a:defRPr sz="1800" kern="1200">
-                <a:solidFill>
-                  <a:schemeClr val="tx1"/>
-                </a:solidFill>
-                <a:latin typeface="+mn-lt"/>
-                <a:ea typeface="+mn-ea"/>
-                <a:cs typeface="+mn-cs"/>
-              </a:defRPr>
-            </a:lvl9pPr>
-          </a:lstStyle>
-          <a:p>
-            <a:r>
-              <a:rPr lang="en-US"/>
-              <a:t>Trang thời tiết:</a:t>
-            </a:r>
-          </a:p>
-          <a:p>
-            <a:endParaRPr lang="vi-VN"/>
+        <p:txBody>
+          <a:bodyPr/>
+          <a:lstStyle/>
+          <a:p>
+            <a:pPr marL="0" indent="0">
+              <a:buNone/>
+            </a:pPr>
+            <a:r>
+              <a:rPr lang="en-US" sz="2400"/>
+              <a:t>https://github.com/LuuHoangPhucB1906551/B1906551.git</a:t>
+            </a:r>
+            <a:endParaRPr lang="vi-VN" sz="2400"/>
           </a:p>
         </p:txBody>
       </p:sp>
     </p:spTree>
     <p:extLst>
       <p:ext uri="{BB962C8B-B14F-4D97-AF65-F5344CB8AC3E}">
-        <p14:creationId xmlns:p14="http://schemas.microsoft.com/office/powerpoint/2010/main" val="3764537967"/>
+        <p14:creationId xmlns:p14="http://schemas.microsoft.com/office/powerpoint/2010/main" val="2143517475"/>
       </p:ext>
     </p:extLst>
   </p:cSld>
@@ -5262,98 +5076,6 @@
 </file>
 
 <file path=ppt/slides/slide20.xml><?xml version="1.0" encoding="utf-8"?>
-<p:sld xmlns:a="http://schemas.openxmlformats.org/drawingml/2006/main" xmlns:r="http://schemas.openxmlformats.org/officeDocument/2006/relationships" xmlns:p="http://schemas.openxmlformats.org/presentationml/2006/main">
-  <p:cSld>
-    <p:spTree>
-      <p:nvGrpSpPr>
-        <p:cNvPr id="1" name=""/>
-        <p:cNvGrpSpPr/>
-        <p:nvPr/>
-      </p:nvGrpSpPr>
-      <p:grpSpPr>
-        <a:xfrm>
-          <a:off x="0" y="0"/>
-          <a:ext cx="0" cy="0"/>
-          <a:chOff x="0" y="0"/>
-          <a:chExt cx="0" cy="0"/>
-        </a:xfrm>
-      </p:grpSpPr>
-      <p:sp>
-        <p:nvSpPr>
-          <p:cNvPr id="2" name="Title 1"/>
-          <p:cNvSpPr>
-            <a:spLocks noGrp="1"/>
-          </p:cNvSpPr>
-          <p:nvPr>
-            <p:ph type="title"/>
-          </p:nvPr>
-        </p:nvSpPr>
-        <p:spPr/>
-        <p:txBody>
-          <a:bodyPr/>
-          <a:lstStyle/>
-          <a:p>
-            <a:r>
-              <a:rPr lang="en-US"/>
-              <a:t>Mã nguồn</a:t>
-            </a:r>
-            <a:endParaRPr lang="vi-VN"/>
-          </a:p>
-        </p:txBody>
-      </p:sp>
-      <p:sp>
-        <p:nvSpPr>
-          <p:cNvPr id="3" name="Content Placeholder 2"/>
-          <p:cNvSpPr>
-            <a:spLocks noGrp="1"/>
-          </p:cNvSpPr>
-          <p:nvPr>
-            <p:ph idx="1"/>
-          </p:nvPr>
-        </p:nvSpPr>
-        <p:spPr>
-          <a:xfrm>
-            <a:off x="609600" y="3276600"/>
-            <a:ext cx="8229600" cy="728662"/>
-          </a:xfrm>
-        </p:spPr>
-        <p:txBody>
-          <a:bodyPr/>
-          <a:lstStyle/>
-          <a:p>
-            <a:pPr marL="0" indent="0">
-              <a:buNone/>
-            </a:pPr>
-            <a:r>
-              <a:rPr lang="en-US">
-                <a:hlinkClick r:id="rId2"/>
-              </a:rPr>
-              <a:t>https://github.com/ThaiHien-2k/CT449_Project</a:t>
-            </a:r>
-            <a:endParaRPr lang="en-US"/>
-          </a:p>
-          <a:p>
-            <a:pPr marL="0" indent="0">
-              <a:buNone/>
-            </a:pPr>
-            <a:endParaRPr lang="vi-VN"/>
-          </a:p>
-        </p:txBody>
-      </p:sp>
-    </p:spTree>
-    <p:extLst>
-      <p:ext uri="{BB962C8B-B14F-4D97-AF65-F5344CB8AC3E}">
-        <p14:creationId xmlns:p14="http://schemas.microsoft.com/office/powerpoint/2010/main" val="2143517475"/>
-      </p:ext>
-    </p:extLst>
-  </p:cSld>
-  <p:clrMapOvr>
-    <a:masterClrMapping/>
-  </p:clrMapOvr>
-</p:sld>
-</file>
-
-<file path=ppt/slides/slide21.xml><?xml version="1.0" encoding="utf-8"?>
 <p:sld xmlns:a="http://schemas.openxmlformats.org/drawingml/2006/main" xmlns:r="http://schemas.openxmlformats.org/officeDocument/2006/relationships" xmlns:p="http://schemas.openxmlformats.org/presentationml/2006/main" showMasterSp="0">
   <p:cSld>
     <p:bg>

</xml_diff>